<commit_message>
Updation Phase added in lifecycle
</commit_message>
<xml_diff>
--- a/ReactJSLecture 8.pptx
+++ b/ReactJSLecture 8.pptx
@@ -18,6 +18,11 @@
     <p:sldId id="266" r:id="rId12"/>
     <p:sldId id="268" r:id="rId13"/>
     <p:sldId id="267" r:id="rId14"/>
+    <p:sldId id="269" r:id="rId15"/>
+    <p:sldId id="270" r:id="rId16"/>
+    <p:sldId id="271" r:id="rId17"/>
+    <p:sldId id="272" r:id="rId18"/>
+    <p:sldId id="273" r:id="rId19"/>
   </p:sldIdLst>
   <p:sldSz cx="12192000" cy="6858000"/>
   <p:notesSz cx="6858000" cy="9144000"/>
@@ -313,7 +318,7 @@
             <a:fld id="{B61BEF0D-F0BB-DE4B-95CE-6DB70DBA9567}" type="datetimeFigureOut">
               <a:rPr lang="en-US" dirty="0"/>
               <a:pPr/>
-              <a:t>11/23/2023</a:t>
+              <a:t>11/27/2023</a:t>
             </a:fld>
             <a:endParaRPr lang="en-US" dirty="0"/>
           </a:p>
@@ -648,7 +653,7 @@
             <a:fld id="{B61BEF0D-F0BB-DE4B-95CE-6DB70DBA9567}" type="datetimeFigureOut">
               <a:rPr lang="en-US" dirty="0"/>
               <a:pPr/>
-              <a:t>11/23/2023</a:t>
+              <a:t>11/27/2023</a:t>
             </a:fld>
             <a:endParaRPr lang="en-US" dirty="0"/>
           </a:p>
@@ -1046,7 +1051,7 @@
             <a:fld id="{B61BEF0D-F0BB-DE4B-95CE-6DB70DBA9567}" type="datetimeFigureOut">
               <a:rPr lang="en-US" dirty="0"/>
               <a:pPr/>
-              <a:t>11/23/2023</a:t>
+              <a:t>11/27/2023</a:t>
             </a:fld>
             <a:endParaRPr lang="en-US" dirty="0"/>
           </a:p>
@@ -1379,7 +1384,7 @@
             <a:fld id="{B61BEF0D-F0BB-DE4B-95CE-6DB70DBA9567}" type="datetimeFigureOut">
               <a:rPr lang="en-US" dirty="0"/>
               <a:pPr/>
-              <a:t>11/23/2023</a:t>
+              <a:t>11/27/2023</a:t>
             </a:fld>
             <a:endParaRPr lang="en-US" dirty="0"/>
           </a:p>
@@ -1696,7 +1701,7 @@
             <a:fld id="{B61BEF0D-F0BB-DE4B-95CE-6DB70DBA9567}" type="datetimeFigureOut">
               <a:rPr lang="en-US" dirty="0"/>
               <a:pPr/>
-              <a:t>11/23/2023</a:t>
+              <a:t>11/27/2023</a:t>
             </a:fld>
             <a:endParaRPr lang="en-US" dirty="0"/>
           </a:p>
@@ -2089,7 +2094,7 @@
             <a:fld id="{B61BEF0D-F0BB-DE4B-95CE-6DB70DBA9567}" type="datetimeFigureOut">
               <a:rPr lang="en-US" dirty="0"/>
               <a:pPr/>
-              <a:t>11/23/2023</a:t>
+              <a:t>11/27/2023</a:t>
             </a:fld>
             <a:endParaRPr lang="en-US" dirty="0"/>
           </a:p>
@@ -2343,7 +2348,7 @@
             <a:fld id="{B61BEF0D-F0BB-DE4B-95CE-6DB70DBA9567}" type="datetimeFigureOut">
               <a:rPr lang="en-US" dirty="0"/>
               <a:pPr/>
-              <a:t>11/23/2023</a:t>
+              <a:t>11/27/2023</a:t>
             </a:fld>
             <a:endParaRPr lang="en-US" dirty="0"/>
           </a:p>
@@ -2602,7 +2607,7 @@
             <a:fld id="{B61BEF0D-F0BB-DE4B-95CE-6DB70DBA9567}" type="datetimeFigureOut">
               <a:rPr lang="en-US" dirty="0"/>
               <a:pPr/>
-              <a:t>11/23/2023</a:t>
+              <a:t>11/27/2023</a:t>
             </a:fld>
             <a:endParaRPr lang="en-US" dirty="0"/>
           </a:p>
@@ -2861,7 +2866,7 @@
             <a:fld id="{B61BEF0D-F0BB-DE4B-95CE-6DB70DBA9567}" type="datetimeFigureOut">
               <a:rPr lang="en-US" dirty="0"/>
               <a:pPr/>
-              <a:t>11/23/2023</a:t>
+              <a:t>11/27/2023</a:t>
             </a:fld>
             <a:endParaRPr lang="en-US" dirty="0"/>
           </a:p>
@@ -3187,7 +3192,7 @@
             <a:fld id="{B61BEF0D-F0BB-DE4B-95CE-6DB70DBA9567}" type="datetimeFigureOut">
               <a:rPr lang="en-US" dirty="0"/>
               <a:pPr/>
-              <a:t>11/23/2023</a:t>
+              <a:t>11/27/2023</a:t>
             </a:fld>
             <a:endParaRPr lang="en-US" dirty="0"/>
           </a:p>
@@ -3507,7 +3512,7 @@
             <a:fld id="{B61BEF0D-F0BB-DE4B-95CE-6DB70DBA9567}" type="datetimeFigureOut">
               <a:rPr lang="en-US" dirty="0"/>
               <a:pPr/>
-              <a:t>11/23/2023</a:t>
+              <a:t>11/27/2023</a:t>
             </a:fld>
             <a:endParaRPr lang="en-US" dirty="0"/>
           </a:p>
@@ -3961,7 +3966,7 @@
             <a:fld id="{B61BEF0D-F0BB-DE4B-95CE-6DB70DBA9567}" type="datetimeFigureOut">
               <a:rPr lang="en-US" dirty="0"/>
               <a:pPr/>
-              <a:t>11/23/2023</a:t>
+              <a:t>11/27/2023</a:t>
             </a:fld>
             <a:endParaRPr lang="en-US" dirty="0"/>
           </a:p>
@@ -4163,7 +4168,7 @@
             <a:fld id="{B61BEF0D-F0BB-DE4B-95CE-6DB70DBA9567}" type="datetimeFigureOut">
               <a:rPr lang="en-US" dirty="0"/>
               <a:pPr/>
-              <a:t>11/23/2023</a:t>
+              <a:t>11/27/2023</a:t>
             </a:fld>
             <a:endParaRPr lang="en-US" dirty="0"/>
           </a:p>
@@ -4337,7 +4342,7 @@
             <a:fld id="{B61BEF0D-F0BB-DE4B-95CE-6DB70DBA9567}" type="datetimeFigureOut">
               <a:rPr lang="en-US" dirty="0"/>
               <a:pPr/>
-              <a:t>11/23/2023</a:t>
+              <a:t>11/27/2023</a:t>
             </a:fld>
             <a:endParaRPr lang="en-US" dirty="0"/>
           </a:p>
@@ -4667,7 +4672,7 @@
             <a:fld id="{B61BEF0D-F0BB-DE4B-95CE-6DB70DBA9567}" type="datetimeFigureOut">
               <a:rPr lang="en-US" dirty="0"/>
               <a:pPr/>
-              <a:t>11/23/2023</a:t>
+              <a:t>11/27/2023</a:t>
             </a:fld>
             <a:endParaRPr lang="en-US" dirty="0"/>
           </a:p>
@@ -5009,7 +5014,7 @@
             <a:fld id="{B61BEF0D-F0BB-DE4B-95CE-6DB70DBA9567}" type="datetimeFigureOut">
               <a:rPr lang="en-US" dirty="0"/>
               <a:pPr/>
-              <a:t>11/23/2023</a:t>
+              <a:t>11/27/2023</a:t>
             </a:fld>
             <a:endParaRPr lang="en-US" dirty="0"/>
           </a:p>
@@ -7123,7 +7128,7 @@
             <a:fld id="{B61BEF0D-F0BB-DE4B-95CE-6DB70DBA9567}" type="datetimeFigureOut">
               <a:rPr lang="en-US" dirty="0"/>
               <a:pPr/>
-              <a:t>11/23/2023</a:t>
+              <a:t>11/27/2023</a:t>
             </a:fld>
             <a:endParaRPr lang="en-US" dirty="0"/>
           </a:p>
@@ -8190,6 +8195,1263 @@
 </p:sld>
 </file>
 
+<file path=ppt/slides/slide14.xml><?xml version="1.0" encoding="utf-8"?>
+<p:sld xmlns:a="http://schemas.openxmlformats.org/drawingml/2006/main" xmlns:r="http://schemas.openxmlformats.org/officeDocument/2006/relationships" xmlns:p="http://schemas.openxmlformats.org/presentationml/2006/main">
+  <p:cSld>
+    <p:spTree>
+      <p:nvGrpSpPr>
+        <p:cNvPr id="1" name=""/>
+        <p:cNvGrpSpPr/>
+        <p:nvPr/>
+      </p:nvGrpSpPr>
+      <p:grpSpPr>
+        <a:xfrm>
+          <a:off x="0" y="0"/>
+          <a:ext cx="0" cy="0"/>
+          <a:chOff x="0" y="0"/>
+          <a:chExt cx="0" cy="0"/>
+        </a:xfrm>
+      </p:grpSpPr>
+      <p:sp>
+        <p:nvSpPr>
+          <p:cNvPr id="2" name="Title 1"/>
+          <p:cNvSpPr>
+            <a:spLocks noGrp="1"/>
+          </p:cNvSpPr>
+          <p:nvPr>
+            <p:ph type="title"/>
+          </p:nvPr>
+        </p:nvSpPr>
+        <p:spPr>
+          <a:xfrm>
+            <a:off x="2592925" y="624110"/>
+            <a:ext cx="8911687" cy="793629"/>
+          </a:xfrm>
+        </p:spPr>
+        <p:txBody>
+          <a:bodyPr/>
+          <a:lstStyle/>
+          <a:p>
+            <a:r>
+              <a:rPr lang="en-US" dirty="0" smtClean="0"/>
+              <a:t>Mounting Phase</a:t>
+            </a:r>
+            <a:endParaRPr lang="en-US" dirty="0"/>
+          </a:p>
+        </p:txBody>
+      </p:sp>
+      <p:sp>
+        <p:nvSpPr>
+          <p:cNvPr id="3" name="Content Placeholder 2"/>
+          <p:cNvSpPr>
+            <a:spLocks noGrp="1"/>
+          </p:cNvSpPr>
+          <p:nvPr>
+            <p:ph idx="1"/>
+          </p:nvPr>
+        </p:nvSpPr>
+        <p:spPr>
+          <a:xfrm>
+            <a:off x="2117558" y="1568741"/>
+            <a:ext cx="10074442" cy="5289259"/>
+          </a:xfrm>
+        </p:spPr>
+        <p:txBody>
+          <a:bodyPr/>
+          <a:lstStyle/>
+          <a:p>
+            <a:pPr>
+              <a:buFont typeface="+mj-lt"/>
+              <a:buAutoNum type="arabicPeriod"/>
+            </a:pPr>
+            <a:r>
+              <a:rPr lang="en-US" dirty="0" smtClean="0"/>
+              <a:t>Constructor()</a:t>
+            </a:r>
+          </a:p>
+          <a:p>
+            <a:pPr lvl="1">
+              <a:buFont typeface="Wingdings" panose="05000000000000000000" pitchFamily="2" charset="2"/>
+              <a:buChar char="ü"/>
+            </a:pPr>
+            <a:r>
+              <a:rPr lang="en-US" dirty="0" smtClean="0"/>
+              <a:t>It is called when the component is first created.</a:t>
+            </a:r>
+          </a:p>
+          <a:p>
+            <a:pPr lvl="1">
+              <a:buFont typeface="Wingdings" panose="05000000000000000000" pitchFamily="2" charset="2"/>
+              <a:buChar char="ü"/>
+            </a:pPr>
+            <a:r>
+              <a:rPr lang="en-US" dirty="0" smtClean="0"/>
+              <a:t>To initialize the component’s initial state</a:t>
+            </a:r>
+          </a:p>
+          <a:p>
+            <a:pPr lvl="1">
+              <a:buFont typeface="Wingdings" panose="05000000000000000000" pitchFamily="2" charset="2"/>
+              <a:buChar char="ü"/>
+            </a:pPr>
+            <a:r>
+              <a:rPr lang="en-US" dirty="0" smtClean="0"/>
+              <a:t>Bind the methods using bind()</a:t>
+            </a:r>
+          </a:p>
+          <a:p>
+            <a:pPr>
+              <a:buFont typeface="+mj-lt"/>
+              <a:buAutoNum type="arabicPeriod"/>
+            </a:pPr>
+            <a:r>
+              <a:rPr lang="en-US" dirty="0" err="1" smtClean="0"/>
+              <a:t>getDerivedStateFromProps</a:t>
+            </a:r>
+            <a:r>
+              <a:rPr lang="en-US" dirty="0" smtClean="0"/>
+              <a:t>()</a:t>
+            </a:r>
+          </a:p>
+          <a:p>
+            <a:pPr lvl="1">
+              <a:buFont typeface="Wingdings" panose="05000000000000000000" pitchFamily="2" charset="2"/>
+              <a:buChar char="ü"/>
+            </a:pPr>
+            <a:r>
+              <a:rPr lang="en-US" dirty="0" smtClean="0"/>
+              <a:t>It is used to update component’s state based on changes in props before render</a:t>
+            </a:r>
+          </a:p>
+          <a:p>
+            <a:pPr lvl="1">
+              <a:buFont typeface="Wingdings" panose="05000000000000000000" pitchFamily="2" charset="2"/>
+              <a:buChar char="ü"/>
+            </a:pPr>
+            <a:r>
+              <a:rPr lang="en-US" dirty="0" smtClean="0"/>
+              <a:t>Static </a:t>
+            </a:r>
+            <a:r>
+              <a:rPr lang="en-US" dirty="0" err="1" smtClean="0"/>
+              <a:t>getDerivedStateFromProps</a:t>
+            </a:r>
+            <a:r>
+              <a:rPr lang="en-US" dirty="0" smtClean="0"/>
+              <a:t>(props , state)</a:t>
+            </a:r>
+          </a:p>
+          <a:p>
+            <a:pPr>
+              <a:buFont typeface="+mj-lt"/>
+              <a:buAutoNum type="arabicPeriod"/>
+            </a:pPr>
+            <a:r>
+              <a:rPr lang="en-US" dirty="0" smtClean="0"/>
+              <a:t>Render()</a:t>
+            </a:r>
+          </a:p>
+          <a:p>
+            <a:pPr>
+              <a:buFont typeface="+mj-lt"/>
+              <a:buAutoNum type="arabicPeriod"/>
+            </a:pPr>
+            <a:r>
+              <a:rPr lang="en-US" dirty="0" err="1" smtClean="0"/>
+              <a:t>componentDidMount</a:t>
+            </a:r>
+            <a:r>
+              <a:rPr lang="en-US" dirty="0" smtClean="0"/>
+              <a:t>()</a:t>
+            </a:r>
+          </a:p>
+          <a:p>
+            <a:pPr lvl="1">
+              <a:buFont typeface="Wingdings" panose="05000000000000000000" pitchFamily="2" charset="2"/>
+              <a:buChar char="ü"/>
+            </a:pPr>
+            <a:r>
+              <a:rPr lang="en-US" dirty="0" smtClean="0"/>
+              <a:t>Once component has been mounted into the DOM, it is called</a:t>
+            </a:r>
+          </a:p>
+          <a:p>
+            <a:pPr marL="0" indent="0">
+              <a:buNone/>
+            </a:pPr>
+            <a:endParaRPr lang="en-US" dirty="0"/>
+          </a:p>
+          <a:p>
+            <a:pPr marL="0" indent="0">
+              <a:buNone/>
+            </a:pPr>
+            <a:endParaRPr lang="en-US" dirty="0"/>
+          </a:p>
+        </p:txBody>
+      </p:sp>
+    </p:spTree>
+    <p:extLst>
+      <p:ext uri="{BB962C8B-B14F-4D97-AF65-F5344CB8AC3E}">
+        <p14:creationId xmlns:p14="http://schemas.microsoft.com/office/powerpoint/2010/main" val="2484936647"/>
+      </p:ext>
+    </p:extLst>
+  </p:cSld>
+  <p:clrMapOvr>
+    <a:masterClrMapping/>
+  </p:clrMapOvr>
+</p:sld>
+</file>
+
+<file path=ppt/slides/slide15.xml><?xml version="1.0" encoding="utf-8"?>
+<p:sld xmlns:a="http://schemas.openxmlformats.org/drawingml/2006/main" xmlns:r="http://schemas.openxmlformats.org/officeDocument/2006/relationships" xmlns:p="http://schemas.openxmlformats.org/presentationml/2006/main">
+  <p:cSld>
+    <p:spTree>
+      <p:nvGrpSpPr>
+        <p:cNvPr id="1" name=""/>
+        <p:cNvGrpSpPr/>
+        <p:nvPr/>
+      </p:nvGrpSpPr>
+      <p:grpSpPr>
+        <a:xfrm>
+          <a:off x="0" y="0"/>
+          <a:ext cx="0" cy="0"/>
+          <a:chOff x="0" y="0"/>
+          <a:chExt cx="0" cy="0"/>
+        </a:xfrm>
+      </p:grpSpPr>
+      <p:sp>
+        <p:nvSpPr>
+          <p:cNvPr id="2" name="Title 1"/>
+          <p:cNvSpPr>
+            <a:spLocks noGrp="1"/>
+          </p:cNvSpPr>
+          <p:nvPr>
+            <p:ph type="title"/>
+          </p:nvPr>
+        </p:nvSpPr>
+        <p:spPr>
+          <a:xfrm>
+            <a:off x="1661747" y="62048"/>
+            <a:ext cx="8911687" cy="931974"/>
+          </a:xfrm>
+        </p:spPr>
+        <p:txBody>
+          <a:bodyPr/>
+          <a:lstStyle/>
+          <a:p>
+            <a:r>
+              <a:rPr lang="en-US" dirty="0" smtClean="0"/>
+              <a:t>Example</a:t>
+            </a:r>
+            <a:endParaRPr lang="en-US" dirty="0"/>
+          </a:p>
+        </p:txBody>
+      </p:sp>
+      <p:sp>
+        <p:nvSpPr>
+          <p:cNvPr id="3" name="Content Placeholder 2"/>
+          <p:cNvSpPr>
+            <a:spLocks noGrp="1"/>
+          </p:cNvSpPr>
+          <p:nvPr>
+            <p:ph idx="1"/>
+          </p:nvPr>
+        </p:nvSpPr>
+        <p:spPr>
+          <a:xfrm>
+            <a:off x="1635854" y="679509"/>
+            <a:ext cx="9868758" cy="6178492"/>
+          </a:xfrm>
+        </p:spPr>
+        <p:txBody>
+          <a:bodyPr/>
+          <a:lstStyle/>
+          <a:p>
+            <a:pPr marL="0" indent="0">
+              <a:buNone/>
+            </a:pPr>
+            <a:r>
+              <a:rPr lang="en-US" b="1" dirty="0" smtClean="0"/>
+              <a:t>App.js</a:t>
+            </a:r>
+          </a:p>
+          <a:p>
+            <a:pPr marL="0" indent="0">
+              <a:buNone/>
+            </a:pPr>
+            <a:r>
+              <a:rPr lang="en-US" dirty="0" smtClean="0"/>
+              <a:t>	&lt;</a:t>
+            </a:r>
+            <a:r>
+              <a:rPr lang="en-US" dirty="0"/>
+              <a:t>LifeCycle myname="Testtt</a:t>
+            </a:r>
+            <a:r>
+              <a:rPr lang="en-US" dirty="0" smtClean="0"/>
+              <a:t>"/&gt;</a:t>
+            </a:r>
+          </a:p>
+          <a:p>
+            <a:pPr marL="0" indent="0">
+              <a:buNone/>
+            </a:pPr>
+            <a:r>
+              <a:rPr lang="en-US" b="1" dirty="0" smtClean="0"/>
+              <a:t>LifeCycle.js</a:t>
+            </a:r>
+          </a:p>
+          <a:p>
+            <a:pPr marL="0" indent="0">
+              <a:buNone/>
+            </a:pPr>
+            <a:endParaRPr lang="en-US" dirty="0"/>
+          </a:p>
+        </p:txBody>
+      </p:sp>
+      <p:pic>
+        <p:nvPicPr>
+          <p:cNvPr id="4" name="Picture 3"/>
+          <p:cNvPicPr>
+            <a:picLocks noChangeAspect="1"/>
+          </p:cNvPicPr>
+          <p:nvPr/>
+        </p:nvPicPr>
+        <p:blipFill>
+          <a:blip r:embed="rId2"/>
+          <a:stretch>
+            <a:fillRect/>
+          </a:stretch>
+        </p:blipFill>
+        <p:spPr>
+          <a:xfrm>
+            <a:off x="4471332" y="1590730"/>
+            <a:ext cx="4559661" cy="5141436"/>
+          </a:xfrm>
+          <a:prstGeom prst="rect">
+            <a:avLst/>
+          </a:prstGeom>
+        </p:spPr>
+      </p:pic>
+    </p:spTree>
+    <p:extLst>
+      <p:ext uri="{BB962C8B-B14F-4D97-AF65-F5344CB8AC3E}">
+        <p14:creationId xmlns:p14="http://schemas.microsoft.com/office/powerpoint/2010/main" val="3337314045"/>
+      </p:ext>
+    </p:extLst>
+  </p:cSld>
+  <p:clrMapOvr>
+    <a:masterClrMapping/>
+  </p:clrMapOvr>
+</p:sld>
+</file>
+
+<file path=ppt/slides/slide16.xml><?xml version="1.0" encoding="utf-8"?>
+<p:sld xmlns:a="http://schemas.openxmlformats.org/drawingml/2006/main" xmlns:r="http://schemas.openxmlformats.org/officeDocument/2006/relationships" xmlns:p="http://schemas.openxmlformats.org/presentationml/2006/main">
+  <p:cSld>
+    <p:spTree>
+      <p:nvGrpSpPr>
+        <p:cNvPr id="1" name=""/>
+        <p:cNvGrpSpPr/>
+        <p:nvPr/>
+      </p:nvGrpSpPr>
+      <p:grpSpPr>
+        <a:xfrm>
+          <a:off x="0" y="0"/>
+          <a:ext cx="0" cy="0"/>
+          <a:chOff x="0" y="0"/>
+          <a:chExt cx="0" cy="0"/>
+        </a:xfrm>
+      </p:grpSpPr>
+      <p:sp>
+        <p:nvSpPr>
+          <p:cNvPr id="2" name="Title 1"/>
+          <p:cNvSpPr>
+            <a:spLocks noGrp="1"/>
+          </p:cNvSpPr>
+          <p:nvPr>
+            <p:ph type="title"/>
+          </p:nvPr>
+        </p:nvSpPr>
+        <p:spPr>
+          <a:xfrm>
+            <a:off x="1921806" y="179494"/>
+            <a:ext cx="8911687" cy="598428"/>
+          </a:xfrm>
+        </p:spPr>
+        <p:txBody>
+          <a:bodyPr>
+            <a:normAutofit fontScale="90000"/>
+          </a:bodyPr>
+          <a:lstStyle/>
+          <a:p>
+            <a:r>
+              <a:rPr lang="en-US" dirty="0" smtClean="0"/>
+              <a:t>Updation Phase</a:t>
+            </a:r>
+            <a:endParaRPr lang="en-US" dirty="0"/>
+          </a:p>
+        </p:txBody>
+      </p:sp>
+      <p:sp>
+        <p:nvSpPr>
+          <p:cNvPr id="3" name="Content Placeholder 2"/>
+          <p:cNvSpPr>
+            <a:spLocks noGrp="1"/>
+          </p:cNvSpPr>
+          <p:nvPr>
+            <p:ph idx="1"/>
+          </p:nvPr>
+        </p:nvSpPr>
+        <p:spPr>
+          <a:xfrm>
+            <a:off x="1910687" y="736980"/>
+            <a:ext cx="9593925" cy="6121020"/>
+          </a:xfrm>
+        </p:spPr>
+        <p:txBody>
+          <a:bodyPr>
+            <a:normAutofit fontScale="92500" lnSpcReduction="10000"/>
+          </a:bodyPr>
+          <a:lstStyle/>
+          <a:p>
+            <a:endParaRPr lang="en-US" dirty="0" smtClean="0"/>
+          </a:p>
+          <a:p>
+            <a:r>
+              <a:rPr lang="en-US" dirty="0" smtClean="0"/>
+              <a:t>shouldComponentUpdate</a:t>
+            </a:r>
+            <a:r>
+              <a:rPr lang="en-US" dirty="0" smtClean="0"/>
+              <a:t>()</a:t>
+            </a:r>
+          </a:p>
+          <a:p>
+            <a:pPr lvl="1">
+              <a:buFont typeface="Wingdings" panose="05000000000000000000" pitchFamily="2" charset="2"/>
+              <a:buChar char="Ø"/>
+            </a:pPr>
+            <a:r>
+              <a:rPr lang="en-US" dirty="0" smtClean="0"/>
+              <a:t>It is called before a component is called.</a:t>
+            </a:r>
+          </a:p>
+          <a:p>
+            <a:pPr lvl="1">
+              <a:buFont typeface="Wingdings" panose="05000000000000000000" pitchFamily="2" charset="2"/>
+              <a:buChar char="Ø"/>
+            </a:pPr>
+            <a:r>
+              <a:rPr lang="en-US" dirty="0" smtClean="0"/>
+              <a:t>2 arguments : nextProps, </a:t>
+            </a:r>
+            <a:r>
+              <a:rPr lang="en-US" dirty="0" smtClean="0"/>
+              <a:t>nextState</a:t>
+            </a:r>
+          </a:p>
+          <a:p>
+            <a:pPr lvl="1">
+              <a:buFont typeface="Wingdings" panose="05000000000000000000" pitchFamily="2" charset="2"/>
+              <a:buChar char="Ø"/>
+            </a:pPr>
+            <a:r>
+              <a:rPr lang="en-US" dirty="0"/>
+              <a:t>This method returns a </a:t>
+            </a:r>
+            <a:r>
+              <a:rPr lang="en-US" dirty="0" err="1"/>
+              <a:t>boolean</a:t>
+            </a:r>
+            <a:r>
+              <a:rPr lang="en-US" dirty="0"/>
+              <a:t> value that determines whether the component should update or not</a:t>
+            </a:r>
+            <a:r>
+              <a:rPr lang="en-US" dirty="0" smtClean="0"/>
+              <a:t>.</a:t>
+            </a:r>
+            <a:r>
+              <a:rPr lang="en-US" dirty="0" smtClean="0"/>
+              <a:t/>
+            </a:r>
+            <a:br>
+              <a:rPr lang="en-US" dirty="0" smtClean="0"/>
+            </a:br>
+            <a:endParaRPr lang="en-US" dirty="0" smtClean="0"/>
+          </a:p>
+          <a:p>
+            <a:r>
+              <a:rPr lang="en-US" dirty="0" smtClean="0"/>
+              <a:t>componentWillUpdate</a:t>
+            </a:r>
+            <a:r>
+              <a:rPr lang="en-US" dirty="0"/>
+              <a:t>()</a:t>
+            </a:r>
+          </a:p>
+          <a:p>
+            <a:pPr lvl="1">
+              <a:buFont typeface="Wingdings" panose="05000000000000000000" pitchFamily="2" charset="2"/>
+              <a:buChar char="Ø"/>
+            </a:pPr>
+            <a:r>
+              <a:rPr lang="en-US" dirty="0"/>
+              <a:t>It is called before a component is </a:t>
+            </a:r>
+            <a:r>
+              <a:rPr lang="en-US" dirty="0" smtClean="0"/>
+              <a:t>updated.</a:t>
+            </a:r>
+            <a:endParaRPr lang="en-US" dirty="0"/>
+          </a:p>
+          <a:p>
+            <a:pPr lvl="1">
+              <a:buFont typeface="Wingdings" panose="05000000000000000000" pitchFamily="2" charset="2"/>
+              <a:buChar char="Ø"/>
+            </a:pPr>
+            <a:r>
+              <a:rPr lang="en-US" dirty="0"/>
+              <a:t>2 arguments : nextProps, nextState</a:t>
+            </a:r>
+          </a:p>
+          <a:p>
+            <a:pPr lvl="1">
+              <a:buFont typeface="Wingdings" panose="05000000000000000000" pitchFamily="2" charset="2"/>
+              <a:buChar char="Ø"/>
+            </a:pPr>
+            <a:r>
+              <a:rPr lang="en-US" dirty="0" smtClean="0"/>
+              <a:t>It is used for API calls.</a:t>
+            </a:r>
+          </a:p>
+          <a:p>
+            <a:pPr lvl="1">
+              <a:buFont typeface="Wingdings" panose="05000000000000000000" pitchFamily="2" charset="2"/>
+              <a:buChar char="Ø"/>
+            </a:pPr>
+            <a:endParaRPr lang="en-US" dirty="0" smtClean="0"/>
+          </a:p>
+          <a:p>
+            <a:r>
+              <a:rPr lang="en-US" dirty="0" smtClean="0"/>
+              <a:t>componentDidUpdate()</a:t>
+            </a:r>
+            <a:endParaRPr lang="en-US" dirty="0"/>
+          </a:p>
+          <a:p>
+            <a:pPr lvl="1">
+              <a:buFont typeface="Wingdings" panose="05000000000000000000" pitchFamily="2" charset="2"/>
+              <a:buChar char="Ø"/>
+            </a:pPr>
+            <a:r>
+              <a:rPr lang="en-US" dirty="0"/>
+              <a:t>It is called </a:t>
+            </a:r>
+            <a:r>
+              <a:rPr lang="en-US" dirty="0" smtClean="0"/>
+              <a:t>after </a:t>
+            </a:r>
+            <a:r>
+              <a:rPr lang="en-US" dirty="0"/>
+              <a:t>a component has been updated and re-rendered</a:t>
+            </a:r>
+            <a:r>
+              <a:rPr lang="en-US" dirty="0" smtClean="0"/>
+              <a:t>.</a:t>
+            </a:r>
+            <a:endParaRPr lang="en-US" dirty="0"/>
+          </a:p>
+          <a:p>
+            <a:pPr lvl="1">
+              <a:buFont typeface="Wingdings" panose="05000000000000000000" pitchFamily="2" charset="2"/>
+              <a:buChar char="Ø"/>
+            </a:pPr>
+            <a:r>
+              <a:rPr lang="en-US" dirty="0"/>
+              <a:t>2 arguments : </a:t>
+            </a:r>
+            <a:r>
+              <a:rPr lang="en-US" dirty="0" err="1" smtClean="0"/>
+              <a:t>prevProps</a:t>
+            </a:r>
+            <a:r>
+              <a:rPr lang="en-US" dirty="0" smtClean="0"/>
+              <a:t>, </a:t>
+            </a:r>
+            <a:r>
+              <a:rPr lang="en-US" dirty="0" err="1" smtClean="0"/>
+              <a:t>prevState</a:t>
+            </a:r>
+            <a:r>
+              <a:rPr lang="en-US" dirty="0" smtClean="0"/>
+              <a:t>.</a:t>
+            </a:r>
+          </a:p>
+          <a:p>
+            <a:pPr lvl="1">
+              <a:buFont typeface="Wingdings" panose="05000000000000000000" pitchFamily="2" charset="2"/>
+              <a:buChar char="Ø"/>
+            </a:pPr>
+            <a:r>
+              <a:rPr lang="en-US" dirty="0" smtClean="0"/>
+              <a:t>It is used to perform additional operation </a:t>
+            </a:r>
+            <a:r>
+              <a:rPr lang="en-US" dirty="0"/>
+              <a:t>when the component's props or state have changed</a:t>
+            </a:r>
+            <a:r>
+              <a:rPr lang="en-US" dirty="0"/>
+              <a:t/>
+            </a:r>
+            <a:br>
+              <a:rPr lang="en-US" dirty="0"/>
+            </a:br>
+            <a:endParaRPr lang="en-US" dirty="0"/>
+          </a:p>
+          <a:p>
+            <a:pPr marL="457200" lvl="1" indent="0">
+              <a:buNone/>
+            </a:pPr>
+            <a:r>
+              <a:rPr lang="en-US" dirty="0"/>
+              <a:t/>
+            </a:r>
+            <a:br>
+              <a:rPr lang="en-US" dirty="0"/>
+            </a:br>
+            <a:endParaRPr lang="en-US" dirty="0"/>
+          </a:p>
+          <a:p>
+            <a:pPr lvl="1">
+              <a:buFont typeface="Wingdings" panose="05000000000000000000" pitchFamily="2" charset="2"/>
+              <a:buChar char="Ø"/>
+            </a:pPr>
+            <a:endParaRPr lang="en-US" dirty="0" smtClean="0"/>
+          </a:p>
+          <a:p>
+            <a:pPr lvl="1">
+              <a:buFont typeface="Wingdings" panose="05000000000000000000" pitchFamily="2" charset="2"/>
+              <a:buChar char="Ø"/>
+            </a:pPr>
+            <a:endParaRPr lang="en-US" dirty="0" smtClean="0"/>
+          </a:p>
+        </p:txBody>
+      </p:sp>
+    </p:spTree>
+    <p:extLst>
+      <p:ext uri="{BB962C8B-B14F-4D97-AF65-F5344CB8AC3E}">
+        <p14:creationId xmlns:p14="http://schemas.microsoft.com/office/powerpoint/2010/main" val="2119365267"/>
+      </p:ext>
+    </p:extLst>
+  </p:cSld>
+  <p:clrMapOvr>
+    <a:masterClrMapping/>
+  </p:clrMapOvr>
+</p:sld>
+</file>
+
+<file path=ppt/slides/slide17.xml><?xml version="1.0" encoding="utf-8"?>
+<p:sld xmlns:a="http://schemas.openxmlformats.org/drawingml/2006/main" xmlns:r="http://schemas.openxmlformats.org/officeDocument/2006/relationships" xmlns:p="http://schemas.openxmlformats.org/presentationml/2006/main">
+  <p:cSld>
+    <p:spTree>
+      <p:nvGrpSpPr>
+        <p:cNvPr id="1" name=""/>
+        <p:cNvGrpSpPr/>
+        <p:nvPr/>
+      </p:nvGrpSpPr>
+      <p:grpSpPr>
+        <a:xfrm>
+          <a:off x="0" y="0"/>
+          <a:ext cx="0" cy="0"/>
+          <a:chOff x="0" y="0"/>
+          <a:chExt cx="0" cy="0"/>
+        </a:xfrm>
+      </p:grpSpPr>
+      <p:sp>
+        <p:nvSpPr>
+          <p:cNvPr id="2" name="Title 1"/>
+          <p:cNvSpPr>
+            <a:spLocks noGrp="1"/>
+          </p:cNvSpPr>
+          <p:nvPr>
+            <p:ph type="title"/>
+          </p:nvPr>
+        </p:nvSpPr>
+        <p:spPr>
+          <a:xfrm>
+            <a:off x="1955101" y="727165"/>
+            <a:ext cx="8911687" cy="727018"/>
+          </a:xfrm>
+        </p:spPr>
+        <p:txBody>
+          <a:bodyPr/>
+          <a:lstStyle/>
+          <a:p>
+            <a:r>
+              <a:rPr lang="en-US" dirty="0" err="1"/>
+              <a:t>Updation</a:t>
+            </a:r>
+            <a:r>
+              <a:rPr lang="en-US" dirty="0"/>
+              <a:t> </a:t>
+            </a:r>
+            <a:r>
+              <a:rPr lang="en-US" dirty="0" smtClean="0"/>
+              <a:t>Phase</a:t>
+            </a:r>
+            <a:endParaRPr lang="en-US" dirty="0"/>
+          </a:p>
+        </p:txBody>
+      </p:sp>
+      <p:sp>
+        <p:nvSpPr>
+          <p:cNvPr id="3" name="Content Placeholder 2"/>
+          <p:cNvSpPr>
+            <a:spLocks noGrp="1"/>
+          </p:cNvSpPr>
+          <p:nvPr>
+            <p:ph idx="1"/>
+          </p:nvPr>
+        </p:nvSpPr>
+        <p:spPr>
+          <a:xfrm>
+            <a:off x="1956643" y="1783122"/>
+            <a:ext cx="9566630" cy="1221336"/>
+          </a:xfrm>
+        </p:spPr>
+        <p:txBody>
+          <a:bodyPr/>
+          <a:lstStyle/>
+          <a:p>
+            <a:r>
+              <a:rPr lang="en-US" dirty="0" err="1" smtClean="0"/>
+              <a:t>getSnapshotBeforeUpdate</a:t>
+            </a:r>
+            <a:r>
+              <a:rPr lang="en-US" dirty="0" smtClean="0"/>
+              <a:t>()</a:t>
+            </a:r>
+          </a:p>
+          <a:p>
+            <a:pPr lvl="1"/>
+            <a:r>
+              <a:rPr lang="en-US" dirty="0" smtClean="0"/>
+              <a:t>It is called before component’s UI is updated</a:t>
+            </a:r>
+          </a:p>
+          <a:p>
+            <a:pPr lvl="1"/>
+            <a:r>
+              <a:rPr lang="en-US" dirty="0" smtClean="0"/>
+              <a:t>It allows to capture value about current state of UI</a:t>
+            </a:r>
+          </a:p>
+          <a:p>
+            <a:pPr lvl="1"/>
+            <a:endParaRPr lang="en-US" dirty="0"/>
+          </a:p>
+        </p:txBody>
+      </p:sp>
+      <p:sp>
+        <p:nvSpPr>
+          <p:cNvPr id="4" name="Title 1"/>
+          <p:cNvSpPr txBox="1">
+            <a:spLocks/>
+          </p:cNvSpPr>
+          <p:nvPr/>
+        </p:nvSpPr>
+        <p:spPr>
+          <a:xfrm>
+            <a:off x="1958212" y="3678747"/>
+            <a:ext cx="8911687" cy="799947"/>
+          </a:xfrm>
+          <a:prstGeom prst="rect">
+            <a:avLst/>
+          </a:prstGeom>
+        </p:spPr>
+        <p:txBody>
+          <a:bodyPr vert="horz" lIns="91440" tIns="45720" rIns="91440" bIns="45720" rtlCol="0" anchor="t">
+            <a:normAutofit/>
+          </a:bodyPr>
+          <a:lstStyle>
+            <a:lvl1pPr algn="l" defTabSz="457200" rtl="0" eaLnBrk="1" latinLnBrk="0" hangingPunct="1">
+              <a:spcBef>
+                <a:spcPct val="0"/>
+              </a:spcBef>
+              <a:buNone/>
+              <a:defRPr sz="3600" kern="1200">
+                <a:solidFill>
+                  <a:schemeClr val="tx1">
+                    <a:lumMod val="85000"/>
+                    <a:lumOff val="15000"/>
+                  </a:schemeClr>
+                </a:solidFill>
+                <a:latin typeface="+mj-lt"/>
+                <a:ea typeface="+mj-ea"/>
+                <a:cs typeface="+mj-cs"/>
+              </a:defRPr>
+            </a:lvl1pPr>
+            <a:lvl2pPr eaLnBrk="1" hangingPunct="1">
+              <a:defRPr>
+                <a:solidFill>
+                  <a:schemeClr val="tx2"/>
+                </a:solidFill>
+              </a:defRPr>
+            </a:lvl2pPr>
+            <a:lvl3pPr eaLnBrk="1" hangingPunct="1">
+              <a:defRPr>
+                <a:solidFill>
+                  <a:schemeClr val="tx2"/>
+                </a:solidFill>
+              </a:defRPr>
+            </a:lvl3pPr>
+            <a:lvl4pPr eaLnBrk="1" hangingPunct="1">
+              <a:defRPr>
+                <a:solidFill>
+                  <a:schemeClr val="tx2"/>
+                </a:solidFill>
+              </a:defRPr>
+            </a:lvl4pPr>
+            <a:lvl5pPr eaLnBrk="1" hangingPunct="1">
+              <a:defRPr>
+                <a:solidFill>
+                  <a:schemeClr val="tx2"/>
+                </a:solidFill>
+              </a:defRPr>
+            </a:lvl5pPr>
+            <a:lvl6pPr eaLnBrk="1" hangingPunct="1">
+              <a:defRPr>
+                <a:solidFill>
+                  <a:schemeClr val="tx2"/>
+                </a:solidFill>
+              </a:defRPr>
+            </a:lvl6pPr>
+            <a:lvl7pPr eaLnBrk="1" hangingPunct="1">
+              <a:defRPr>
+                <a:solidFill>
+                  <a:schemeClr val="tx2"/>
+                </a:solidFill>
+              </a:defRPr>
+            </a:lvl7pPr>
+            <a:lvl8pPr eaLnBrk="1" hangingPunct="1">
+              <a:defRPr>
+                <a:solidFill>
+                  <a:schemeClr val="tx2"/>
+                </a:solidFill>
+              </a:defRPr>
+            </a:lvl8pPr>
+            <a:lvl9pPr eaLnBrk="1" hangingPunct="1">
+              <a:defRPr>
+                <a:solidFill>
+                  <a:schemeClr val="tx2"/>
+                </a:solidFill>
+              </a:defRPr>
+            </a:lvl9pPr>
+          </a:lstStyle>
+          <a:p>
+            <a:r>
+              <a:rPr lang="en-US" dirty="0" smtClean="0"/>
+              <a:t>Unmounting Phase</a:t>
+            </a:r>
+            <a:endParaRPr lang="en-US" dirty="0"/>
+          </a:p>
+        </p:txBody>
+      </p:sp>
+      <p:sp>
+        <p:nvSpPr>
+          <p:cNvPr id="5" name="Content Placeholder 2"/>
+          <p:cNvSpPr txBox="1">
+            <a:spLocks/>
+          </p:cNvSpPr>
+          <p:nvPr/>
+        </p:nvSpPr>
+        <p:spPr>
+          <a:xfrm>
+            <a:off x="1959754" y="4627984"/>
+            <a:ext cx="9566630" cy="2230016"/>
+          </a:xfrm>
+          <a:prstGeom prst="rect">
+            <a:avLst/>
+          </a:prstGeom>
+        </p:spPr>
+        <p:txBody>
+          <a:bodyPr vert="horz" lIns="91440" tIns="45720" rIns="91440" bIns="45720" rtlCol="0">
+            <a:normAutofit/>
+          </a:bodyPr>
+          <a:lstStyle>
+            <a:lvl1pPr marL="342900" indent="-342900" algn="l" defTabSz="457200" rtl="0" eaLnBrk="1" latinLnBrk="0" hangingPunct="1">
+              <a:spcBef>
+                <a:spcPts val="1000"/>
+              </a:spcBef>
+              <a:spcAft>
+                <a:spcPts val="0"/>
+              </a:spcAft>
+              <a:buClr>
+                <a:schemeClr val="accent1"/>
+              </a:buClr>
+              <a:buFont typeface="Wingdings 3" charset="2"/>
+              <a:buChar char=""/>
+              <a:defRPr sz="1800" kern="1200">
+                <a:solidFill>
+                  <a:schemeClr val="tx1">
+                    <a:lumMod val="75000"/>
+                    <a:lumOff val="25000"/>
+                  </a:schemeClr>
+                </a:solidFill>
+                <a:latin typeface="+mn-lt"/>
+                <a:ea typeface="+mn-ea"/>
+                <a:cs typeface="+mn-cs"/>
+              </a:defRPr>
+            </a:lvl1pPr>
+            <a:lvl2pPr marL="742950" indent="-285750" algn="l" defTabSz="457200" rtl="0" eaLnBrk="1" latinLnBrk="0" hangingPunct="1">
+              <a:spcBef>
+                <a:spcPts val="1000"/>
+              </a:spcBef>
+              <a:spcAft>
+                <a:spcPts val="0"/>
+              </a:spcAft>
+              <a:buClr>
+                <a:schemeClr val="accent1"/>
+              </a:buClr>
+              <a:buFont typeface="Wingdings 3" charset="2"/>
+              <a:buChar char=""/>
+              <a:defRPr sz="1600" kern="1200">
+                <a:solidFill>
+                  <a:schemeClr val="tx1">
+                    <a:lumMod val="75000"/>
+                    <a:lumOff val="25000"/>
+                  </a:schemeClr>
+                </a:solidFill>
+                <a:latin typeface="+mn-lt"/>
+                <a:ea typeface="+mn-ea"/>
+                <a:cs typeface="+mn-cs"/>
+              </a:defRPr>
+            </a:lvl2pPr>
+            <a:lvl3pPr marL="1143000" indent="-228600" algn="l" defTabSz="457200" rtl="0" eaLnBrk="1" latinLnBrk="0" hangingPunct="1">
+              <a:spcBef>
+                <a:spcPts val="1000"/>
+              </a:spcBef>
+              <a:spcAft>
+                <a:spcPts val="0"/>
+              </a:spcAft>
+              <a:buClr>
+                <a:schemeClr val="accent1"/>
+              </a:buClr>
+              <a:buFont typeface="Wingdings 3" charset="2"/>
+              <a:buChar char=""/>
+              <a:defRPr sz="1400" kern="1200">
+                <a:solidFill>
+                  <a:schemeClr val="tx1">
+                    <a:lumMod val="75000"/>
+                    <a:lumOff val="25000"/>
+                  </a:schemeClr>
+                </a:solidFill>
+                <a:latin typeface="+mn-lt"/>
+                <a:ea typeface="+mn-ea"/>
+                <a:cs typeface="+mn-cs"/>
+              </a:defRPr>
+            </a:lvl3pPr>
+            <a:lvl4pPr marL="1600200" indent="-228600" algn="l" defTabSz="457200" rtl="0" eaLnBrk="1" latinLnBrk="0" hangingPunct="1">
+              <a:spcBef>
+                <a:spcPts val="1000"/>
+              </a:spcBef>
+              <a:spcAft>
+                <a:spcPts val="0"/>
+              </a:spcAft>
+              <a:buClr>
+                <a:schemeClr val="accent1"/>
+              </a:buClr>
+              <a:buFont typeface="Wingdings 3" charset="2"/>
+              <a:buChar char=""/>
+              <a:defRPr sz="1200" kern="1200">
+                <a:solidFill>
+                  <a:schemeClr val="tx1">
+                    <a:lumMod val="75000"/>
+                    <a:lumOff val="25000"/>
+                  </a:schemeClr>
+                </a:solidFill>
+                <a:latin typeface="+mn-lt"/>
+                <a:ea typeface="+mn-ea"/>
+                <a:cs typeface="+mn-cs"/>
+              </a:defRPr>
+            </a:lvl4pPr>
+            <a:lvl5pPr marL="2057400" indent="-228600" algn="l" defTabSz="457200" rtl="0" eaLnBrk="1" latinLnBrk="0" hangingPunct="1">
+              <a:spcBef>
+                <a:spcPts val="1000"/>
+              </a:spcBef>
+              <a:spcAft>
+                <a:spcPts val="0"/>
+              </a:spcAft>
+              <a:buClr>
+                <a:schemeClr val="accent1"/>
+              </a:buClr>
+              <a:buFont typeface="Wingdings 3" charset="2"/>
+              <a:buChar char=""/>
+              <a:defRPr sz="1200" kern="1200">
+                <a:solidFill>
+                  <a:schemeClr val="tx1">
+                    <a:lumMod val="75000"/>
+                    <a:lumOff val="25000"/>
+                  </a:schemeClr>
+                </a:solidFill>
+                <a:latin typeface="+mn-lt"/>
+                <a:ea typeface="+mn-ea"/>
+                <a:cs typeface="+mn-cs"/>
+              </a:defRPr>
+            </a:lvl5pPr>
+            <a:lvl6pPr marL="2514600" indent="-228600" algn="l" defTabSz="457200" rtl="0" eaLnBrk="1" latinLnBrk="0" hangingPunct="1">
+              <a:spcBef>
+                <a:spcPts val="1000"/>
+              </a:spcBef>
+              <a:spcAft>
+                <a:spcPts val="0"/>
+              </a:spcAft>
+              <a:buClr>
+                <a:schemeClr val="accent1"/>
+              </a:buClr>
+              <a:buFont typeface="Wingdings 3" charset="2"/>
+              <a:buChar char=""/>
+              <a:defRPr sz="1200" kern="1200">
+                <a:solidFill>
+                  <a:schemeClr val="tx1">
+                    <a:lumMod val="75000"/>
+                    <a:lumOff val="25000"/>
+                  </a:schemeClr>
+                </a:solidFill>
+                <a:latin typeface="+mn-lt"/>
+                <a:ea typeface="+mn-ea"/>
+                <a:cs typeface="+mn-cs"/>
+              </a:defRPr>
+            </a:lvl6pPr>
+            <a:lvl7pPr marL="2971800" indent="-228600" algn="l" defTabSz="457200" rtl="0" eaLnBrk="1" latinLnBrk="0" hangingPunct="1">
+              <a:spcBef>
+                <a:spcPts val="1000"/>
+              </a:spcBef>
+              <a:spcAft>
+                <a:spcPts val="0"/>
+              </a:spcAft>
+              <a:buClr>
+                <a:schemeClr val="accent1"/>
+              </a:buClr>
+              <a:buFont typeface="Wingdings 3" charset="2"/>
+              <a:buChar char=""/>
+              <a:defRPr sz="1200" kern="1200">
+                <a:solidFill>
+                  <a:schemeClr val="tx1">
+                    <a:lumMod val="75000"/>
+                    <a:lumOff val="25000"/>
+                  </a:schemeClr>
+                </a:solidFill>
+                <a:latin typeface="+mn-lt"/>
+                <a:ea typeface="+mn-ea"/>
+                <a:cs typeface="+mn-cs"/>
+              </a:defRPr>
+            </a:lvl7pPr>
+            <a:lvl8pPr marL="3429000" indent="-228600" algn="l" defTabSz="457200" rtl="0" eaLnBrk="1" latinLnBrk="0" hangingPunct="1">
+              <a:spcBef>
+                <a:spcPts val="1000"/>
+              </a:spcBef>
+              <a:spcAft>
+                <a:spcPts val="0"/>
+              </a:spcAft>
+              <a:buClr>
+                <a:schemeClr val="accent1"/>
+              </a:buClr>
+              <a:buFont typeface="Wingdings 3" charset="2"/>
+              <a:buChar char=""/>
+              <a:defRPr sz="1200" kern="1200">
+                <a:solidFill>
+                  <a:schemeClr val="tx1">
+                    <a:lumMod val="75000"/>
+                    <a:lumOff val="25000"/>
+                  </a:schemeClr>
+                </a:solidFill>
+                <a:latin typeface="+mn-lt"/>
+                <a:ea typeface="+mn-ea"/>
+                <a:cs typeface="+mn-cs"/>
+              </a:defRPr>
+            </a:lvl8pPr>
+            <a:lvl9pPr marL="3886200" indent="-228600" algn="l" defTabSz="457200" rtl="0" eaLnBrk="1" latinLnBrk="0" hangingPunct="1">
+              <a:spcBef>
+                <a:spcPts val="1000"/>
+              </a:spcBef>
+              <a:spcAft>
+                <a:spcPts val="0"/>
+              </a:spcAft>
+              <a:buClr>
+                <a:schemeClr val="accent1"/>
+              </a:buClr>
+              <a:buFont typeface="Wingdings 3" charset="2"/>
+              <a:buChar char=""/>
+              <a:defRPr sz="1200" kern="1200">
+                <a:solidFill>
+                  <a:schemeClr val="tx1">
+                    <a:lumMod val="75000"/>
+                    <a:lumOff val="25000"/>
+                  </a:schemeClr>
+                </a:solidFill>
+                <a:latin typeface="+mn-lt"/>
+                <a:ea typeface="+mn-ea"/>
+                <a:cs typeface="+mn-cs"/>
+              </a:defRPr>
+            </a:lvl9pPr>
+          </a:lstStyle>
+          <a:p>
+            <a:r>
+              <a:rPr lang="en-US" dirty="0" err="1" smtClean="0"/>
+              <a:t>componentWillUnmount</a:t>
+            </a:r>
+            <a:r>
+              <a:rPr lang="en-US" dirty="0" smtClean="0"/>
+              <a:t>()</a:t>
+            </a:r>
+          </a:p>
+          <a:p>
+            <a:pPr lvl="1"/>
+            <a:r>
+              <a:rPr lang="en-US" dirty="0"/>
+              <a:t>when a component is being removed from the DOM (Document Object Model) </a:t>
+            </a:r>
+            <a:endParaRPr lang="en-US" dirty="0" smtClean="0"/>
+          </a:p>
+          <a:p>
+            <a:pPr lvl="1"/>
+            <a:r>
+              <a:rPr lang="en-US" dirty="0" smtClean="0"/>
+              <a:t>All </a:t>
+            </a:r>
+            <a:r>
+              <a:rPr lang="en-US" dirty="0"/>
+              <a:t>of its state and props are destroyed</a:t>
+            </a:r>
+            <a:r>
+              <a:rPr lang="en-US" dirty="0" smtClean="0"/>
+              <a:t>.</a:t>
+            </a:r>
+          </a:p>
+          <a:p>
+            <a:pPr lvl="1"/>
+            <a:r>
+              <a:rPr lang="en-US" dirty="0" smtClean="0"/>
+              <a:t>We can also clearing some data like canceling </a:t>
+            </a:r>
+            <a:r>
+              <a:rPr lang="en-US" dirty="0" err="1" smtClean="0"/>
+              <a:t>timers,removing</a:t>
+            </a:r>
+            <a:r>
+              <a:rPr lang="en-US" dirty="0" smtClean="0"/>
+              <a:t> event listeners.</a:t>
+            </a:r>
+          </a:p>
+          <a:p>
+            <a:pPr lvl="1"/>
+            <a:endParaRPr lang="en-US" dirty="0"/>
+          </a:p>
+        </p:txBody>
+      </p:sp>
+    </p:spTree>
+    <p:extLst>
+      <p:ext uri="{BB962C8B-B14F-4D97-AF65-F5344CB8AC3E}">
+        <p14:creationId xmlns:p14="http://schemas.microsoft.com/office/powerpoint/2010/main" val="3801620477"/>
+      </p:ext>
+    </p:extLst>
+  </p:cSld>
+  <p:clrMapOvr>
+    <a:masterClrMapping/>
+  </p:clrMapOvr>
+</p:sld>
+</file>
+
+<file path=ppt/slides/slide18.xml><?xml version="1.0" encoding="utf-8"?>
+<p:sld xmlns:a="http://schemas.openxmlformats.org/drawingml/2006/main" xmlns:r="http://schemas.openxmlformats.org/officeDocument/2006/relationships" xmlns:p="http://schemas.openxmlformats.org/presentationml/2006/main">
+  <p:cSld>
+    <p:spTree>
+      <p:nvGrpSpPr>
+        <p:cNvPr id="1" name=""/>
+        <p:cNvGrpSpPr/>
+        <p:nvPr/>
+      </p:nvGrpSpPr>
+      <p:grpSpPr>
+        <a:xfrm>
+          <a:off x="0" y="0"/>
+          <a:ext cx="0" cy="0"/>
+          <a:chOff x="0" y="0"/>
+          <a:chExt cx="0" cy="0"/>
+        </a:xfrm>
+      </p:grpSpPr>
+      <p:sp>
+        <p:nvSpPr>
+          <p:cNvPr id="2" name="Title 1"/>
+          <p:cNvSpPr>
+            <a:spLocks noGrp="1"/>
+          </p:cNvSpPr>
+          <p:nvPr>
+            <p:ph type="title"/>
+          </p:nvPr>
+        </p:nvSpPr>
+        <p:spPr>
+          <a:xfrm>
+            <a:off x="1939782" y="213563"/>
+            <a:ext cx="8911687" cy="570208"/>
+          </a:xfrm>
+        </p:spPr>
+        <p:txBody>
+          <a:bodyPr>
+            <a:normAutofit fontScale="90000"/>
+          </a:bodyPr>
+          <a:lstStyle/>
+          <a:p>
+            <a:r>
+              <a:rPr lang="en-US" dirty="0" smtClean="0"/>
+              <a:t>Example</a:t>
+            </a:r>
+            <a:endParaRPr lang="en-US" dirty="0"/>
+          </a:p>
+        </p:txBody>
+      </p:sp>
+      <p:pic>
+        <p:nvPicPr>
+          <p:cNvPr id="4" name="Content Placeholder 3"/>
+          <p:cNvPicPr>
+            <a:picLocks noGrp="1" noChangeAspect="1"/>
+          </p:cNvPicPr>
+          <p:nvPr>
+            <p:ph idx="1"/>
+          </p:nvPr>
+        </p:nvPicPr>
+        <p:blipFill>
+          <a:blip r:embed="rId2"/>
+          <a:stretch>
+            <a:fillRect/>
+          </a:stretch>
+        </p:blipFill>
+        <p:spPr>
+          <a:xfrm>
+            <a:off x="1954448" y="1013291"/>
+            <a:ext cx="8794454" cy="5844709"/>
+          </a:xfrm>
+          <a:prstGeom prst="rect">
+            <a:avLst/>
+          </a:prstGeom>
+        </p:spPr>
+      </p:pic>
+    </p:spTree>
+    <p:extLst>
+      <p:ext uri="{BB962C8B-B14F-4D97-AF65-F5344CB8AC3E}">
+        <p14:creationId xmlns:p14="http://schemas.microsoft.com/office/powerpoint/2010/main" val="275988256"/>
+      </p:ext>
+    </p:extLst>
+  </p:cSld>
+  <p:clrMapOvr>
+    <a:masterClrMapping/>
+  </p:clrMapOvr>
+</p:sld>
+</file>
+
 <file path=ppt/slides/slide2.xml><?xml version="1.0" encoding="utf-8"?>
 <p:sld xmlns:a="http://schemas.openxmlformats.org/drawingml/2006/main" xmlns:r="http://schemas.openxmlformats.org/officeDocument/2006/relationships" xmlns:p="http://schemas.openxmlformats.org/presentationml/2006/main">
   <p:cSld>

</xml_diff>